<commit_message>
Updating Content for Pittsburgh Workshop
</commit_message>
<xml_diff>
--- a/presentations/5-Hands-on_Lab.pptx
+++ b/presentations/5-Hands-on_Lab.pptx
@@ -193,7 +193,7 @@
           <a:p>
             <a:fld id="{7B47E9F9-6557-4923-BE10-1C342566E3EE}" type="datetimeFigureOut">
               <a:rPr lang="en-US" smtClean="0"/>
-              <a:t>7/18/16</a:t>
+              <a:t>3/30/17</a:t>
             </a:fld>
             <a:endParaRPr lang="en-US"/>
           </a:p>
@@ -7756,30 +7756,30 @@
               <a:buNone/>
             </a:pPr>
             <a:r>
-              <a:rPr lang="en-US" sz="9600" dirty="0">
-                <a:hlinkClick r:id="rId2"/>
-              </a:rPr>
+              <a:rPr lang="en-US" sz="4800" dirty="0"/>
               <a:t>https://</a:t>
             </a:r>
             <a:r>
-              <a:rPr lang="en-US" sz="9600" dirty="0" err="1">
-                <a:hlinkClick r:id="rId2"/>
-              </a:rPr>
-              <a:t>goo.gl</a:t>
-            </a:r>
-            <a:r>
-              <a:rPr lang="en-US" sz="9600" dirty="0">
-                <a:hlinkClick r:id="rId2"/>
-              </a:rPr>
+              <a:rPr lang="en-US" sz="4800" dirty="0" err="1"/>
+              <a:t>github.com</a:t>
+            </a:r>
+            <a:r>
+              <a:rPr lang="en-US" sz="4800" dirty="0"/>
               <a:t>/</a:t>
             </a:r>
             <a:r>
-              <a:rPr lang="en-US" sz="9600" dirty="0" err="1">
-                <a:hlinkClick r:id="rId2"/>
-              </a:rPr>
-              <a:t>QNiZNm</a:t>
-            </a:r>
-            <a:endParaRPr lang="en-US" sz="9600" dirty="0" smtClean="0"/>
+              <a:rPr lang="en-US" sz="4800" dirty="0" err="1"/>
+              <a:t>appalrpivotal</a:t>
+            </a:r>
+            <a:r>
+              <a:rPr lang="en-US" sz="4800" dirty="0"/>
+              <a:t>/PCF-Workshop-</a:t>
+            </a:r>
+            <a:r>
+              <a:rPr lang="en-US" sz="4800" dirty="0" err="1"/>
+              <a:t>Fedex</a:t>
+            </a:r>
+            <a:endParaRPr lang="en-US" sz="4800" dirty="0" smtClean="0"/>
           </a:p>
         </p:txBody>
       </p:sp>

</xml_diff>